<commit_message>
Updated for Josh's Poster
</commit_message>
<xml_diff>
--- a/analysis/AFSPoster/Lyons_WiAFS_Poster 4.pptx
+++ b/analysis/AFSPoster/Lyons_WiAFS_Poster 4.pptx
@@ -216,7 +216,7 @@
           <a:p>
             <a:fld id="{B3FC93A4-82C8-40FE-860D-9D5A5D4DAE6B}" type="datetimeFigureOut">
               <a:rPr lang="en-US" smtClean="0"/>
-              <a:t>2/12/2019</a:t>
+              <a:t>2/14/2019</a:t>
             </a:fld>
             <a:endParaRPr lang="en-US"/>
           </a:p>
@@ -746,7 +746,7 @@
           <a:p>
             <a:fld id="{C64F1C46-C26F-43CC-ADA4-CCA12DEC4E53}" type="datetimeFigureOut">
               <a:rPr lang="en-US" smtClean="0"/>
-              <a:t>2/12/2019</a:t>
+              <a:t>2/14/2019</a:t>
             </a:fld>
             <a:endParaRPr lang="en-US"/>
           </a:p>
@@ -914,7 +914,7 @@
           <a:p>
             <a:fld id="{C64F1C46-C26F-43CC-ADA4-CCA12DEC4E53}" type="datetimeFigureOut">
               <a:rPr lang="en-US" smtClean="0"/>
-              <a:t>2/12/2019</a:t>
+              <a:t>2/14/2019</a:t>
             </a:fld>
             <a:endParaRPr lang="en-US"/>
           </a:p>
@@ -1092,7 +1092,7 @@
           <a:p>
             <a:fld id="{C64F1C46-C26F-43CC-ADA4-CCA12DEC4E53}" type="datetimeFigureOut">
               <a:rPr lang="en-US" smtClean="0"/>
-              <a:t>2/12/2019</a:t>
+              <a:t>2/14/2019</a:t>
             </a:fld>
             <a:endParaRPr lang="en-US"/>
           </a:p>
@@ -1260,7 +1260,7 @@
           <a:p>
             <a:fld id="{C64F1C46-C26F-43CC-ADA4-CCA12DEC4E53}" type="datetimeFigureOut">
               <a:rPr lang="en-US" smtClean="0"/>
-              <a:t>2/12/2019</a:t>
+              <a:t>2/14/2019</a:t>
             </a:fld>
             <a:endParaRPr lang="en-US"/>
           </a:p>
@@ -1505,7 +1505,7 @@
           <a:p>
             <a:fld id="{C64F1C46-C26F-43CC-ADA4-CCA12DEC4E53}" type="datetimeFigureOut">
               <a:rPr lang="en-US" smtClean="0"/>
-              <a:t>2/12/2019</a:t>
+              <a:t>2/14/2019</a:t>
             </a:fld>
             <a:endParaRPr lang="en-US"/>
           </a:p>
@@ -1790,7 +1790,7 @@
           <a:p>
             <a:fld id="{C64F1C46-C26F-43CC-ADA4-CCA12DEC4E53}" type="datetimeFigureOut">
               <a:rPr lang="en-US" smtClean="0"/>
-              <a:t>2/12/2019</a:t>
+              <a:t>2/14/2019</a:t>
             </a:fld>
             <a:endParaRPr lang="en-US"/>
           </a:p>
@@ -2209,7 +2209,7 @@
           <a:p>
             <a:fld id="{C64F1C46-C26F-43CC-ADA4-CCA12DEC4E53}" type="datetimeFigureOut">
               <a:rPr lang="en-US" smtClean="0"/>
-              <a:t>2/12/2019</a:t>
+              <a:t>2/14/2019</a:t>
             </a:fld>
             <a:endParaRPr lang="en-US"/>
           </a:p>
@@ -2326,7 +2326,7 @@
           <a:p>
             <a:fld id="{C64F1C46-C26F-43CC-ADA4-CCA12DEC4E53}" type="datetimeFigureOut">
               <a:rPr lang="en-US" smtClean="0"/>
-              <a:t>2/12/2019</a:t>
+              <a:t>2/14/2019</a:t>
             </a:fld>
             <a:endParaRPr lang="en-US"/>
           </a:p>
@@ -2421,7 +2421,7 @@
           <a:p>
             <a:fld id="{C64F1C46-C26F-43CC-ADA4-CCA12DEC4E53}" type="datetimeFigureOut">
               <a:rPr lang="en-US" smtClean="0"/>
-              <a:t>2/12/2019</a:t>
+              <a:t>2/14/2019</a:t>
             </a:fld>
             <a:endParaRPr lang="en-US"/>
           </a:p>
@@ -2696,7 +2696,7 @@
           <a:p>
             <a:fld id="{C64F1C46-C26F-43CC-ADA4-CCA12DEC4E53}" type="datetimeFigureOut">
               <a:rPr lang="en-US" smtClean="0"/>
-              <a:t>2/12/2019</a:t>
+              <a:t>2/14/2019</a:t>
             </a:fld>
             <a:endParaRPr lang="en-US"/>
           </a:p>
@@ -2948,7 +2948,7 @@
           <a:p>
             <a:fld id="{C64F1C46-C26F-43CC-ADA4-CCA12DEC4E53}" type="datetimeFigureOut">
               <a:rPr lang="en-US" smtClean="0"/>
-              <a:t>2/12/2019</a:t>
+              <a:t>2/14/2019</a:t>
             </a:fld>
             <a:endParaRPr lang="en-US"/>
           </a:p>
@@ -3159,7 +3159,7 @@
           <a:p>
             <a:fld id="{C64F1C46-C26F-43CC-ADA4-CCA12DEC4E53}" type="datetimeFigureOut">
               <a:rPr lang="en-US" smtClean="0"/>
-              <a:t>2/12/2019</a:t>
+              <a:t>2/14/2019</a:t>
             </a:fld>
             <a:endParaRPr lang="en-US"/>
           </a:p>
@@ -3633,11 +3633,7 @@
             </a:r>
             <a:r>
               <a:rPr lang="en-US" sz="3800" dirty="0" smtClean="0"/>
-              <a:t>of </a:t>
-            </a:r>
-            <a:r>
-              <a:rPr lang="en-US" sz="3800" dirty="0" smtClean="0"/>
-              <a:t>the same calcified </a:t>
+              <a:t>of the same calcified </a:t>
             </a:r>
             <a:r>
               <a:rPr lang="en-US" sz="3800" dirty="0"/>
@@ -3677,7 +3673,15 @@
             </a:r>
             <a:r>
               <a:rPr lang="en-US" sz="3800" dirty="0"/>
-              <a:t> (2001) reviewed the use of precision measures </a:t>
+              <a:t> (</a:t>
+            </a:r>
+            <a:r>
+              <a:rPr lang="en-US" sz="3800" dirty="0" smtClean="0"/>
+              <a:t>2001; J. Fish Biol. 59:197-242) </a:t>
+            </a:r>
+            <a:r>
+              <a:rPr lang="en-US" sz="3800" dirty="0"/>
+              <a:t>reviewed the use of precision measures </a:t>
             </a:r>
             <a:r>
               <a:rPr lang="en-US" sz="3800" dirty="0" smtClean="0"/>
@@ -3709,11 +3713,7 @@
             </a:r>
             <a:r>
               <a:rPr lang="en-US" sz="3800" dirty="0" smtClean="0"/>
-              <a:t>uggested </a:t>
-            </a:r>
-            <a:r>
-              <a:rPr lang="en-US" sz="3800" dirty="0" smtClean="0"/>
-              <a:t>using </a:t>
+              <a:t>uggested using </a:t>
             </a:r>
             <a:r>
               <a:rPr lang="en-US" sz="3800" dirty="0"/>
@@ -3835,19 +3835,7 @@
             </a:r>
             <a:r>
               <a:rPr lang="en-US" sz="3800" dirty="0" smtClean="0"/>
-              <a:t>if</a:t>
-            </a:r>
-            <a:r>
-              <a:rPr lang="en-US" sz="3800" dirty="0" smtClean="0"/>
-              <a:t> </a:t>
-            </a:r>
-            <a:r>
-              <a:rPr lang="en-US" sz="3800" dirty="0" smtClean="0"/>
-              <a:t>ACV is affected </a:t>
-            </a:r>
-            <a:r>
-              <a:rPr lang="en-US" sz="3800" dirty="0" smtClean="0"/>
-              <a:t>by </a:t>
+              <a:t>if ACV is affected by </a:t>
             </a:r>
             <a:r>
               <a:rPr lang="en-US" sz="3800" dirty="0"/>
@@ -4150,19 +4138,7 @@
             </a:pPr>
             <a:r>
               <a:rPr lang="en-US" sz="3800" dirty="0" smtClean="0"/>
-              <a:t>The </a:t>
-            </a:r>
-            <a:r>
-              <a:rPr lang="en-US" sz="3800" dirty="0" smtClean="0"/>
-              <a:t>distribution of ACV </a:t>
-            </a:r>
-            <a:r>
-              <a:rPr lang="en-US" sz="3800" dirty="0" smtClean="0"/>
-              <a:t>was </a:t>
-            </a:r>
-            <a:r>
-              <a:rPr lang="en-US" sz="3800" dirty="0" smtClean="0"/>
-              <a:t>right-skewed with a median of </a:t>
+              <a:t>The distribution of ACV was right-skewed with a median of </a:t>
             </a:r>
             <a:r>
               <a:rPr lang="en-US" sz="3800" dirty="0"/>
@@ -4178,11 +4154,7 @@
             </a:r>
             <a:r>
               <a:rPr lang="en-US" sz="3800" dirty="0" smtClean="0"/>
-              <a:t>% (Fig. A</a:t>
-            </a:r>
-            <a:r>
-              <a:rPr lang="en-US" sz="3800" dirty="0" smtClean="0"/>
-              <a:t>).</a:t>
+              <a:t>% (Fig. A).</a:t>
             </a:r>
             <a:endParaRPr lang="en-US" sz="3800" dirty="0"/>
           </a:p>
@@ -4206,12 +4178,16 @@
               <a:t>not differ between </a:t>
             </a:r>
             <a:r>
-              <a:rPr lang="en-US" sz="3800" dirty="0" err="1" smtClean="0"/>
-              <a:t>between</a:t>
-            </a:r>
-            <a:r>
               <a:rPr lang="en-US" sz="3800" dirty="0" smtClean="0"/>
-              <a:t>- and within-reader comparisons (Fig. B) </a:t>
+              <a:t>between-reader </a:t>
+            </a:r>
+            <a:r>
+              <a:rPr lang="en-US" sz="3800" dirty="0" smtClean="0"/>
+              <a:t>and within-reader comparisons (Fig. B</a:t>
+            </a:r>
+            <a:r>
+              <a:rPr lang="en-US" sz="3800" dirty="0" smtClean="0"/>
+              <a:t>), </a:t>
             </a:r>
             <a:r>
               <a:rPr lang="en-US" sz="3800" dirty="0"/>
@@ -4223,11 +4199,15 @@
             </a:r>
             <a:r>
               <a:rPr lang="en-US" sz="3800" dirty="0" err="1" smtClean="0"/>
-              <a:t>Actinopterii</a:t>
+              <a:t>Actinopterygii</a:t>
             </a:r>
             <a:r>
               <a:rPr lang="en-US" sz="3800" dirty="0" smtClean="0"/>
-              <a:t> and </a:t>
+              <a:t> </a:t>
+            </a:r>
+            <a:r>
+              <a:rPr lang="en-US" sz="3800" dirty="0" smtClean="0"/>
+              <a:t>and </a:t>
             </a:r>
             <a:r>
               <a:rPr lang="en-US" sz="3800" dirty="0" err="1" smtClean="0"/>
@@ -4239,15 +4219,7 @@
             </a:r>
             <a:r>
               <a:rPr lang="en-US" sz="3800" dirty="0" smtClean="0"/>
-              <a:t>classes (</a:t>
-            </a:r>
-            <a:r>
-              <a:rPr lang="en-US" sz="3800" dirty="0" smtClean="0"/>
-              <a:t>Fig. </a:t>
-            </a:r>
-            <a:r>
-              <a:rPr lang="en-US" sz="3800" dirty="0" smtClean="0"/>
-              <a:t>C).</a:t>
+              <a:t>classes (Fig. C).</a:t>
             </a:r>
             <a:endParaRPr lang="en-US" sz="3800" dirty="0"/>
           </a:p>
@@ -4328,13 +4300,8 @@
             </a:r>
             <a:r>
               <a:rPr lang="en-US" sz="3800" dirty="0" smtClean="0"/>
-              <a:t>than the median ACV for results with 10-20 and more than 20 observed ages (Fig. </a:t>
-            </a:r>
-            <a:r>
-              <a:rPr lang="en-US" sz="3800" dirty="0" smtClean="0"/>
-              <a:t>E).</a:t>
-            </a:r>
-            <a:endParaRPr lang="en-US" sz="3800" dirty="0" smtClean="0"/>
+              <a:t>than the median ACV for results with 10-20 and more than 20 observed ages (Fig. E).</a:t>
+            </a:r>
           </a:p>
           <a:p>
             <a:pPr marL="457200" indent="-457200">
@@ -4365,15 +4332,7 @@
             </a:r>
             <a:r>
               <a:rPr lang="en-US" sz="3800" dirty="0" smtClean="0"/>
-              <a:t>the median ACV </a:t>
-            </a:r>
-            <a:r>
-              <a:rPr lang="en-US" sz="3800" dirty="0" smtClean="0"/>
-              <a:t>for spines</a:t>
-            </a:r>
-            <a:r>
-              <a:rPr lang="en-US" sz="3800" dirty="0" smtClean="0"/>
-              <a:t>, </a:t>
+              <a:t>the median ACV for spines, </a:t>
             </a:r>
             <a:r>
               <a:rPr lang="en-US" sz="3800" dirty="0" err="1" smtClean="0"/>
@@ -4454,11 +4413,7 @@
             </a:r>
             <a:r>
               <a:rPr lang="en-US" sz="3800" dirty="0"/>
-              <a:t>ACV </a:t>
-            </a:r>
-            <a:r>
-              <a:rPr lang="en-US" sz="3800" dirty="0"/>
-              <a:t>i</a:t>
+              <a:t>ACV i</a:t>
             </a:r>
             <a:r>
               <a:rPr lang="en-US" sz="3800" dirty="0" smtClean="0"/>
@@ -4470,11 +4425,7 @@
             </a:r>
             <a:r>
               <a:rPr lang="en-US" sz="3800" dirty="0" smtClean="0"/>
-              <a:t>by</a:t>
-            </a:r>
-            <a:r>
-              <a:rPr lang="en-US" sz="3800" dirty="0" smtClean="0"/>
-              <a:t> </a:t>
+              <a:t>by </a:t>
             </a:r>
             <a:r>
               <a:rPr lang="en-US" sz="3800" dirty="0"/>
@@ -4482,9 +4433,16 @@
             </a:r>
             <a:r>
               <a:rPr lang="en-US" sz="3800" dirty="0" smtClean="0"/>
-              <a:t>This may be due to more published age precision studies using more structures and more inexperienced readers.</a:t>
-            </a:r>
-            <a:endParaRPr lang="en-US" sz="3800" dirty="0" smtClean="0"/>
+              <a:t>This may be due to more published age precision studies using more </a:t>
+            </a:r>
+            <a:r>
+              <a:rPr lang="en-US" sz="3800" dirty="0" smtClean="0"/>
+              <a:t>calcified structures </a:t>
+            </a:r>
+            <a:r>
+              <a:rPr lang="en-US" sz="3800" dirty="0" smtClean="0"/>
+              <a:t>and more inexperienced readers.</a:t>
+            </a:r>
           </a:p>
           <a:p>
             <a:pPr marL="514350" indent="-514350">
@@ -4609,7 +4567,19 @@
                 </a:pPr>
                 <a:r>
                   <a:rPr lang="en-US" sz="3800" dirty="0" smtClean="0"/>
-                  <a:t>Reviewed 313 papers published since 1983 that reported precision metrics of ageing fish.</a:t>
+                  <a:t>Reviewed 313 papers published since 1983 that reported precision metrics </a:t>
+                </a:r>
+                <a:r>
+                  <a:rPr lang="en-US" sz="3800" dirty="0" smtClean="0"/>
+                  <a:t>from</a:t>
+                </a:r>
+                <a:r>
+                  <a:rPr lang="en-US" sz="3800" dirty="0" smtClean="0"/>
+                  <a:t> </a:t>
+                </a:r>
+                <a:r>
+                  <a:rPr lang="en-US" sz="3800" dirty="0" smtClean="0"/>
+                  <a:t>ageing fish.</a:t>
                 </a:r>
               </a:p>
               <a:p>
@@ -4625,15 +4595,23 @@
                 </a:pPr>
                 <a:r>
                   <a:rPr lang="en-US" sz="3800" dirty="0" smtClean="0"/>
-                  <a:t>Recorded </a:t>
+                  <a:t>Recorded precision </a:t>
                 </a:r>
                 <a:r>
                   <a:rPr lang="en-US" sz="3800" dirty="0" smtClean="0"/>
-                  <a:t>precision </a:t>
+                  <a:t>metric(s) </a:t>
                 </a:r>
                 <a:r>
                   <a:rPr lang="en-US" sz="3800" dirty="0" smtClean="0"/>
-                  <a:t>metrics used, the observed metric value, and various characteristics of the study (e.g., number of readings, type of calcified structure).</a:t>
+                  <a:t>used, the observed metric </a:t>
+                </a:r>
+                <a:r>
+                  <a:rPr lang="en-US" sz="3800" dirty="0" smtClean="0"/>
+                  <a:t>value(s), </a:t>
+                </a:r>
+                <a:r>
+                  <a:rPr lang="en-US" sz="3800" dirty="0" smtClean="0"/>
+                  <a:t>and various characteristics of the study (e.g., number of readings, type of calcified structure).</a:t>
                 </a:r>
                 <a:endParaRPr lang="en-US" sz="3800" dirty="0"/>
               </a:p>
@@ -4650,7 +4628,23 @@
                 </a:pPr>
                 <a:r>
                   <a:rPr lang="en-US" sz="3800" dirty="0" smtClean="0"/>
-                  <a:t>APE-only results were converted to ACV results with ACV=</a:t>
+                  <a:t>APE-only results were converted to ACV </a:t>
+                </a:r>
+                <a:r>
+                  <a:rPr lang="en-US" sz="3800" dirty="0"/>
+                  <a:t>results when </a:t>
+                </a:r>
+                <a:r>
+                  <a:rPr lang="en-US" sz="3800" dirty="0" smtClean="0"/>
+                  <a:t>two </a:t>
+                </a:r>
+                <a:r>
+                  <a:rPr lang="en-US" sz="3800" dirty="0"/>
+                  <a:t>repeated readings were made </a:t>
+                </a:r>
+                <a:r>
+                  <a:rPr lang="en-US" sz="3800" dirty="0" smtClean="0"/>
+                  <a:t>with ACV=</a:t>
                 </a:r>
                 <a14:m>
                   <m:oMath xmlns:m="http://schemas.openxmlformats.org/officeDocument/2006/math">
@@ -4677,7 +4671,7 @@
                 </a14:m>
                 <a:r>
                   <a:rPr lang="en-US" sz="3800" dirty="0" smtClean="0"/>
-                  <a:t>APE when 2 repeated readings were made.</a:t>
+                  <a:t>APE.</a:t>
                 </a:r>
                 <a:endParaRPr lang="en-US" sz="3800" dirty="0" smtClean="0"/>
               </a:p>
@@ -4706,11 +4700,15 @@
                 </a:r>
                 <a:r>
                   <a:rPr lang="en-US" sz="3800" dirty="0" smtClean="0"/>
-                  <a:t>Test (and Dunn’s post hoc test) </a:t>
+                  <a:t>Test (and Dunn’s </a:t>
                 </a:r>
                 <a:r>
                   <a:rPr lang="en-US" sz="3800" dirty="0" smtClean="0"/>
-                  <a:t>to examine </a:t>
+                  <a:t>post-hoc </a:t>
+                </a:r>
+                <a:r>
+                  <a:rPr lang="en-US" sz="3800" dirty="0" smtClean="0"/>
+                  <a:t>test) to examine </a:t>
                 </a:r>
                 <a:r>
                   <a:rPr lang="en-US" sz="3800" dirty="0"/>
@@ -4797,27 +4795,7 @@
             </a:r>
             <a:r>
               <a:rPr lang="en-US" sz="4000" dirty="0" smtClean="0"/>
-              <a:t>Density of observed ACV values </a:t>
-            </a:r>
-            <a:r>
-              <a:rPr lang="en-US" sz="4000" dirty="0" smtClean="0"/>
-              <a:t>for </a:t>
-            </a:r>
-            <a:r>
-              <a:rPr lang="en-US" sz="4000" dirty="0" smtClean="0"/>
-              <a:t>all studies (A) and by comparison type (B), class of fish (C), number of repeated readings (D), range of observed ages (E), and type of calcified structure (F). Vertical white lines are the median</a:t>
-            </a:r>
-            <a:r>
-              <a:rPr lang="en-US" sz="4000" dirty="0" smtClean="0"/>
-              <a:t>, whereas vertical </a:t>
-            </a:r>
-            <a:r>
-              <a:rPr lang="en-US" sz="4000" dirty="0" smtClean="0"/>
-              <a:t>black lines are Q1 and Q3</a:t>
-            </a:r>
-            <a:r>
-              <a:rPr lang="en-US" sz="4000" dirty="0" smtClean="0"/>
-              <a:t>. The </a:t>
+              <a:t>Density of observed ACV values for all studies (A) and by comparison type (B), class of fish (C), number of repeated readings (D), range of observed ages (E), and type of calcified structure (F). Vertical white lines are the median, whereas vertical black lines are Q1 and Q3. The </a:t>
             </a:r>
             <a:r>
               <a:rPr lang="en-US" sz="4000" dirty="0" err="1" smtClean="0"/>
@@ -4833,7 +4811,7 @@
       </p:sp>
       <p:pic>
         <p:nvPicPr>
-          <p:cNvPr id="3" name="Picture 2"/>
+          <p:cNvPr id="2" name="Picture 1"/>
           <p:cNvPicPr>
             <a:picLocks noChangeAspect="1"/>
           </p:cNvPicPr>
@@ -4853,7 +4831,7 @@
         </p:blipFill>
         <p:spPr>
           <a:xfrm>
-            <a:off x="18440400" y="11795759"/>
+            <a:off x="18440400" y="11812925"/>
             <a:ext cx="19202400" cy="12801600"/>
           </a:xfrm>
           <a:prstGeom prst="rect">

</xml_diff>